<commit_message>
Agregar nuevos archivos a DOCUMENTOS FASE1
</commit_message>
<xml_diff>
--- a/DOCUMENTOS FASE1/evidencias grupales/Presentacion_Proyecto.pptx
+++ b/DOCUMENTOS FASE1/evidencias grupales/Presentacion_Proyecto.pptx
@@ -269,6 +269,11 @@
       </a:defRPr>
     </a:lvl9pPr>
   </p:defaultTextStyle>
+  <p:extLst>
+    <p:ext uri="{EFAFB233-063F-42B5-8137-9DF3F51BA10A}">
+      <p15:sldGuideLst xmlns:p15="http://schemas.microsoft.com/office/powerpoint/2012/main"/>
+    </p:ext>
+  </p:extLst>
 </p:presentation>
 </file>
 
@@ -10602,7 +10607,31 @@
                 <a:cs typeface="Montserrat"/>
                 <a:sym typeface="Montserrat"/>
               </a:rPr>
-              <a:t>HU16 (Alta): Como docente evaluador, quiero acceder al uso del sistema para entender su uso.</a:t>
+              <a:t>HU16 (Alta): Como docente evaluador, quiero </a:t>
+            </a:r>
+            <a:r>
+              <a:rPr lang="es" sz="1100">
+                <a:solidFill>
+                  <a:schemeClr val="dk1"/>
+                </a:solidFill>
+                <a:latin typeface="Montserrat"/>
+                <a:ea typeface="Montserrat"/>
+                <a:cs typeface="Montserrat"/>
+                <a:sym typeface="Montserrat"/>
+              </a:rPr>
+              <a:t>acceder al sistema </a:t>
+            </a:r>
+            <a:r>
+              <a:rPr lang="es" sz="1100" dirty="0">
+                <a:solidFill>
+                  <a:schemeClr val="dk1"/>
+                </a:solidFill>
+                <a:latin typeface="Montserrat"/>
+                <a:ea typeface="Montserrat"/>
+                <a:cs typeface="Montserrat"/>
+                <a:sym typeface="Montserrat"/>
+              </a:rPr>
+              <a:t>para entender su uso.</a:t>
             </a:r>
             <a:br>
               <a:rPr lang="es" sz="1100" dirty="0">

</xml_diff>